<commit_message>
completet personas, included in presentation
</commit_message>
<xml_diff>
--- a/doc/task03/Design Thinking.pptx
+++ b/doc/task03/Design Thinking.pptx
@@ -10,9 +10,13 @@
     <p:sldId id="258" r:id="rId4"/>
     <p:sldId id="259" r:id="rId5"/>
     <p:sldId id="260" r:id="rId6"/>
-    <p:sldId id="261" r:id="rId7"/>
-    <p:sldId id="262" r:id="rId8"/>
-    <p:sldId id="263" r:id="rId9"/>
+    <p:sldId id="264" r:id="rId7"/>
+    <p:sldId id="265" r:id="rId8"/>
+    <p:sldId id="266" r:id="rId9"/>
+    <p:sldId id="267" r:id="rId10"/>
+    <p:sldId id="261" r:id="rId11"/>
+    <p:sldId id="262" r:id="rId12"/>
+    <p:sldId id="263" r:id="rId13"/>
   </p:sldIdLst>
   <p:sldSz cx="12192000" cy="6858000"/>
   <p:notesSz cx="6858000" cy="9144000"/>
@@ -111,6 +115,11 @@
       </a:defRPr>
     </a:lvl9pPr>
   </p:defaultTextStyle>
+  <p:extLst>
+    <p:ext uri="{EFAFB233-063F-42B5-8137-9DF3F51BA10A}">
+      <p15:sldGuideLst xmlns:p15="http://schemas.microsoft.com/office/powerpoint/2012/main"/>
+    </p:ext>
+  </p:extLst>
 </p:presentation>
 </file>
 
@@ -245,7 +254,7 @@
           <a:p>
             <a:fld id="{13F33D18-4877-44FD-BBA4-29C1220F681C}" type="datetimeFigureOut">
               <a:rPr lang="de-CH" smtClean="0"/>
-              <a:t>13.03.2015</a:t>
+              <a:t>15.03.2015</a:t>
             </a:fld>
             <a:endParaRPr lang="de-CH"/>
           </a:p>
@@ -415,7 +424,7 @@
           <a:p>
             <a:fld id="{13F33D18-4877-44FD-BBA4-29C1220F681C}" type="datetimeFigureOut">
               <a:rPr lang="de-CH" smtClean="0"/>
-              <a:t>13.03.2015</a:t>
+              <a:t>15.03.2015</a:t>
             </a:fld>
             <a:endParaRPr lang="de-CH"/>
           </a:p>
@@ -595,7 +604,7 @@
           <a:p>
             <a:fld id="{13F33D18-4877-44FD-BBA4-29C1220F681C}" type="datetimeFigureOut">
               <a:rPr lang="de-CH" smtClean="0"/>
-              <a:t>13.03.2015</a:t>
+              <a:t>15.03.2015</a:t>
             </a:fld>
             <a:endParaRPr lang="de-CH"/>
           </a:p>
@@ -765,7 +774,7 @@
           <a:p>
             <a:fld id="{13F33D18-4877-44FD-BBA4-29C1220F681C}" type="datetimeFigureOut">
               <a:rPr lang="de-CH" smtClean="0"/>
-              <a:t>13.03.2015</a:t>
+              <a:t>15.03.2015</a:t>
             </a:fld>
             <a:endParaRPr lang="de-CH"/>
           </a:p>
@@ -1011,7 +1020,7 @@
           <a:p>
             <a:fld id="{13F33D18-4877-44FD-BBA4-29C1220F681C}" type="datetimeFigureOut">
               <a:rPr lang="de-CH" smtClean="0"/>
-              <a:t>13.03.2015</a:t>
+              <a:t>15.03.2015</a:t>
             </a:fld>
             <a:endParaRPr lang="de-CH"/>
           </a:p>
@@ -1243,7 +1252,7 @@
           <a:p>
             <a:fld id="{13F33D18-4877-44FD-BBA4-29C1220F681C}" type="datetimeFigureOut">
               <a:rPr lang="de-CH" smtClean="0"/>
-              <a:t>13.03.2015</a:t>
+              <a:t>15.03.2015</a:t>
             </a:fld>
             <a:endParaRPr lang="de-CH"/>
           </a:p>
@@ -1610,7 +1619,7 @@
           <a:p>
             <a:fld id="{13F33D18-4877-44FD-BBA4-29C1220F681C}" type="datetimeFigureOut">
               <a:rPr lang="de-CH" smtClean="0"/>
-              <a:t>13.03.2015</a:t>
+              <a:t>15.03.2015</a:t>
             </a:fld>
             <a:endParaRPr lang="de-CH"/>
           </a:p>
@@ -1728,7 +1737,7 @@
           <a:p>
             <a:fld id="{13F33D18-4877-44FD-BBA4-29C1220F681C}" type="datetimeFigureOut">
               <a:rPr lang="de-CH" smtClean="0"/>
-              <a:t>13.03.2015</a:t>
+              <a:t>15.03.2015</a:t>
             </a:fld>
             <a:endParaRPr lang="de-CH"/>
           </a:p>
@@ -1823,7 +1832,7 @@
           <a:p>
             <a:fld id="{13F33D18-4877-44FD-BBA4-29C1220F681C}" type="datetimeFigureOut">
               <a:rPr lang="de-CH" smtClean="0"/>
-              <a:t>13.03.2015</a:t>
+              <a:t>15.03.2015</a:t>
             </a:fld>
             <a:endParaRPr lang="de-CH"/>
           </a:p>
@@ -2100,7 +2109,7 @@
           <a:p>
             <a:fld id="{13F33D18-4877-44FD-BBA4-29C1220F681C}" type="datetimeFigureOut">
               <a:rPr lang="de-CH" smtClean="0"/>
-              <a:t>13.03.2015</a:t>
+              <a:t>15.03.2015</a:t>
             </a:fld>
             <a:endParaRPr lang="de-CH"/>
           </a:p>
@@ -2353,7 +2362,7 @@
           <a:p>
             <a:fld id="{13F33D18-4877-44FD-BBA4-29C1220F681C}" type="datetimeFigureOut">
               <a:rPr lang="de-CH" smtClean="0"/>
-              <a:t>13.03.2015</a:t>
+              <a:t>15.03.2015</a:t>
             </a:fld>
             <a:endParaRPr lang="de-CH"/>
           </a:p>
@@ -2566,7 +2575,7 @@
           <a:p>
             <a:fld id="{13F33D18-4877-44FD-BBA4-29C1220F681C}" type="datetimeFigureOut">
               <a:rPr lang="de-CH" smtClean="0"/>
-              <a:t>13.03.2015</a:t>
+              <a:t>15.03.2015</a:t>
             </a:fld>
             <a:endParaRPr lang="de-CH"/>
           </a:p>
@@ -3074,6 +3083,222 @@
 </p:sld>
 </file>
 
+<file path=ppt/slides/slide10.xml><?xml version="1.0" encoding="utf-8"?>
+<p:sld xmlns:a="http://schemas.openxmlformats.org/drawingml/2006/main" xmlns:r="http://schemas.openxmlformats.org/officeDocument/2006/relationships" xmlns:p="http://schemas.openxmlformats.org/presentationml/2006/main">
+  <p:cSld>
+    <p:spTree>
+      <p:nvGrpSpPr>
+        <p:cNvPr id="1" name=""/>
+        <p:cNvGrpSpPr/>
+        <p:nvPr/>
+      </p:nvGrpSpPr>
+      <p:grpSpPr>
+        <a:xfrm>
+          <a:off x="0" y="0"/>
+          <a:ext cx="0" cy="0"/>
+          <a:chOff x="0" y="0"/>
+          <a:chExt cx="0" cy="0"/>
+        </a:xfrm>
+      </p:grpSpPr>
+      <p:sp>
+        <p:nvSpPr>
+          <p:cNvPr id="2" name="Titel 1"/>
+          <p:cNvSpPr>
+            <a:spLocks noGrp="1"/>
+          </p:cNvSpPr>
+          <p:nvPr>
+            <p:ph type="title"/>
+          </p:nvPr>
+        </p:nvSpPr>
+        <p:spPr/>
+        <p:txBody>
+          <a:bodyPr/>
+          <a:lstStyle/>
+          <a:p>
+            <a:r>
+              <a:rPr lang="de-CH" dirty="0" smtClean="0"/>
+              <a:t>Stories</a:t>
+            </a:r>
+            <a:endParaRPr lang="de-CH" dirty="0"/>
+          </a:p>
+        </p:txBody>
+      </p:sp>
+      <p:sp>
+        <p:nvSpPr>
+          <p:cNvPr id="3" name="Inhaltsplatzhalter 2"/>
+          <p:cNvSpPr>
+            <a:spLocks noGrp="1"/>
+          </p:cNvSpPr>
+          <p:nvPr>
+            <p:ph idx="1"/>
+          </p:nvPr>
+        </p:nvSpPr>
+        <p:spPr/>
+        <p:txBody>
+          <a:bodyPr/>
+          <a:lstStyle/>
+          <a:p>
+            <a:endParaRPr lang="de-CH"/>
+          </a:p>
+        </p:txBody>
+      </p:sp>
+    </p:spTree>
+    <p:extLst>
+      <p:ext uri="{BB962C8B-B14F-4D97-AF65-F5344CB8AC3E}">
+        <p14:creationId xmlns:p14="http://schemas.microsoft.com/office/powerpoint/2010/main" val="3453189645"/>
+      </p:ext>
+    </p:extLst>
+  </p:cSld>
+  <p:clrMapOvr>
+    <a:masterClrMapping/>
+  </p:clrMapOvr>
+</p:sld>
+</file>
+
+<file path=ppt/slides/slide11.xml><?xml version="1.0" encoding="utf-8"?>
+<p:sld xmlns:a="http://schemas.openxmlformats.org/drawingml/2006/main" xmlns:r="http://schemas.openxmlformats.org/officeDocument/2006/relationships" xmlns:p="http://schemas.openxmlformats.org/presentationml/2006/main">
+  <p:cSld>
+    <p:spTree>
+      <p:nvGrpSpPr>
+        <p:cNvPr id="1" name=""/>
+        <p:cNvGrpSpPr/>
+        <p:nvPr/>
+      </p:nvGrpSpPr>
+      <p:grpSpPr>
+        <a:xfrm>
+          <a:off x="0" y="0"/>
+          <a:ext cx="0" cy="0"/>
+          <a:chOff x="0" y="0"/>
+          <a:chExt cx="0" cy="0"/>
+        </a:xfrm>
+      </p:grpSpPr>
+      <p:sp>
+        <p:nvSpPr>
+          <p:cNvPr id="2" name="Titel 1"/>
+          <p:cNvSpPr>
+            <a:spLocks noGrp="1"/>
+          </p:cNvSpPr>
+          <p:nvPr>
+            <p:ph type="title"/>
+          </p:nvPr>
+        </p:nvSpPr>
+        <p:spPr/>
+        <p:txBody>
+          <a:bodyPr/>
+          <a:lstStyle/>
+          <a:p>
+            <a:r>
+              <a:rPr lang="de-CH" dirty="0" smtClean="0"/>
+              <a:t>Prototypen</a:t>
+            </a:r>
+            <a:endParaRPr lang="de-CH" dirty="0"/>
+          </a:p>
+        </p:txBody>
+      </p:sp>
+      <p:sp>
+        <p:nvSpPr>
+          <p:cNvPr id="3" name="Inhaltsplatzhalter 2"/>
+          <p:cNvSpPr>
+            <a:spLocks noGrp="1"/>
+          </p:cNvSpPr>
+          <p:nvPr>
+            <p:ph idx="1"/>
+          </p:nvPr>
+        </p:nvSpPr>
+        <p:spPr/>
+        <p:txBody>
+          <a:bodyPr/>
+          <a:lstStyle/>
+          <a:p>
+            <a:endParaRPr lang="de-CH"/>
+          </a:p>
+        </p:txBody>
+      </p:sp>
+    </p:spTree>
+    <p:extLst>
+      <p:ext uri="{BB962C8B-B14F-4D97-AF65-F5344CB8AC3E}">
+        <p14:creationId xmlns:p14="http://schemas.microsoft.com/office/powerpoint/2010/main" val="1512302900"/>
+      </p:ext>
+    </p:extLst>
+  </p:cSld>
+  <p:clrMapOvr>
+    <a:masterClrMapping/>
+  </p:clrMapOvr>
+</p:sld>
+</file>
+
+<file path=ppt/slides/slide12.xml><?xml version="1.0" encoding="utf-8"?>
+<p:sld xmlns:a="http://schemas.openxmlformats.org/drawingml/2006/main" xmlns:r="http://schemas.openxmlformats.org/officeDocument/2006/relationships" xmlns:p="http://schemas.openxmlformats.org/presentationml/2006/main">
+  <p:cSld>
+    <p:spTree>
+      <p:nvGrpSpPr>
+        <p:cNvPr id="1" name=""/>
+        <p:cNvGrpSpPr/>
+        <p:nvPr/>
+      </p:nvGrpSpPr>
+      <p:grpSpPr>
+        <a:xfrm>
+          <a:off x="0" y="0"/>
+          <a:ext cx="0" cy="0"/>
+          <a:chOff x="0" y="0"/>
+          <a:chExt cx="0" cy="0"/>
+        </a:xfrm>
+      </p:grpSpPr>
+      <p:sp>
+        <p:nvSpPr>
+          <p:cNvPr id="2" name="Titel 1"/>
+          <p:cNvSpPr>
+            <a:spLocks noGrp="1"/>
+          </p:cNvSpPr>
+          <p:nvPr>
+            <p:ph type="title"/>
+          </p:nvPr>
+        </p:nvSpPr>
+        <p:spPr/>
+        <p:txBody>
+          <a:bodyPr/>
+          <a:lstStyle/>
+          <a:p>
+            <a:r>
+              <a:rPr lang="de-CH" dirty="0" smtClean="0"/>
+              <a:t>Fragen</a:t>
+            </a:r>
+            <a:endParaRPr lang="de-CH" dirty="0"/>
+          </a:p>
+        </p:txBody>
+      </p:sp>
+      <p:sp>
+        <p:nvSpPr>
+          <p:cNvPr id="3" name="Inhaltsplatzhalter 2"/>
+          <p:cNvSpPr>
+            <a:spLocks noGrp="1"/>
+          </p:cNvSpPr>
+          <p:nvPr>
+            <p:ph idx="1"/>
+          </p:nvPr>
+        </p:nvSpPr>
+        <p:spPr/>
+        <p:txBody>
+          <a:bodyPr/>
+          <a:lstStyle/>
+          <a:p>
+            <a:endParaRPr lang="de-CH"/>
+          </a:p>
+        </p:txBody>
+      </p:sp>
+    </p:spTree>
+    <p:extLst>
+      <p:ext uri="{BB962C8B-B14F-4D97-AF65-F5344CB8AC3E}">
+        <p14:creationId xmlns:p14="http://schemas.microsoft.com/office/powerpoint/2010/main" val="1298196516"/>
+      </p:ext>
+    </p:extLst>
+  </p:cSld>
+  <p:clrMapOvr>
+    <a:masterClrMapping/>
+  </p:clrMapOvr>
+</p:sld>
+</file>
+
 <file path=ppt/slides/slide2.xml><?xml version="1.0" encoding="utf-8"?>
 <p:sld xmlns:a="http://schemas.openxmlformats.org/drawingml/2006/main" xmlns:r="http://schemas.openxmlformats.org/officeDocument/2006/relationships" xmlns:p="http://schemas.openxmlformats.org/presentationml/2006/main">
   <p:cSld>
@@ -3151,8 +3376,19 @@
             </a:r>
             <a:r>
               <a:rPr lang="de-CH" dirty="0" smtClean="0"/>
-              <a:t> Scopes</a:t>
-            </a:r>
+              <a:t> </a:t>
+            </a:r>
+            <a:r>
+              <a:rPr lang="de-CH" dirty="0" smtClean="0"/>
+              <a:t>Scopes</a:t>
+            </a:r>
+          </a:p>
+          <a:p>
+            <a:r>
+              <a:rPr lang="de-CH" dirty="0" err="1" smtClean="0"/>
+              <a:t>Personas</a:t>
+            </a:r>
+            <a:endParaRPr lang="de-CH" dirty="0" smtClean="0"/>
           </a:p>
           <a:p>
             <a:r>
@@ -3532,10 +3768,13 @@
           <a:lstStyle/>
           <a:p>
             <a:r>
-              <a:rPr lang="de-CH" dirty="0" smtClean="0"/>
-              <a:t>Stories</a:t>
-            </a:r>
-            <a:endParaRPr lang="de-CH" dirty="0"/>
+              <a:rPr lang="de-CH" dirty="0" err="1" smtClean="0"/>
+              <a:t>Personas</a:t>
+            </a:r>
+            <a:r>
+              <a:rPr lang="de-CH" dirty="0"/>
+              <a:t>, Persona "Heinz"</a:t>
+            </a:r>
           </a:p>
         </p:txBody>
       </p:sp>
@@ -3551,17 +3790,138 @@
         </p:nvSpPr>
         <p:spPr/>
         <p:txBody>
-          <a:bodyPr/>
-          <a:lstStyle/>
-          <a:p>
-            <a:endParaRPr lang="de-CH"/>
+          <a:bodyPr>
+            <a:normAutofit fontScale="70000" lnSpcReduction="20000"/>
+          </a:bodyPr>
+          <a:lstStyle/>
+          <a:p>
+            <a:r>
+              <a:rPr lang="de-CH" dirty="0" smtClean="0"/>
+              <a:t>Arbeitslos </a:t>
+            </a:r>
+            <a:r>
+              <a:rPr lang="de-CH" dirty="0"/>
+              <a:t>/ lebt seit 7 Jahren vom Sozialamt</a:t>
+            </a:r>
+          </a:p>
+          <a:p>
+            <a:r>
+              <a:rPr lang="de-CH" dirty="0" smtClean="0"/>
+              <a:t>Alkoholsüchtig</a:t>
+            </a:r>
+            <a:r>
+              <a:rPr lang="de-CH" dirty="0"/>
+              <a:t>; Die Sucht bestimmt sein Leben; Nahrungsaufnahme und restliches wird dann zur Nebensache</a:t>
+            </a:r>
+          </a:p>
+          <a:p>
+            <a:r>
+              <a:rPr lang="de-CH" dirty="0" smtClean="0"/>
+              <a:t>Alter</a:t>
+            </a:r>
+            <a:r>
+              <a:rPr lang="de-CH" dirty="0"/>
+              <a:t>: 47</a:t>
+            </a:r>
+          </a:p>
+          <a:p>
+            <a:r>
+              <a:rPr lang="de-CH" dirty="0"/>
+              <a:t>L</a:t>
+            </a:r>
+            <a:r>
+              <a:rPr lang="de-CH" dirty="0" smtClean="0"/>
+              <a:t>ebt </a:t>
+            </a:r>
+            <a:r>
+              <a:rPr lang="de-CH" dirty="0"/>
+              <a:t>allein in 2-Zimmerwohung</a:t>
+            </a:r>
+          </a:p>
+          <a:p>
+            <a:r>
+              <a:rPr lang="de-CH" dirty="0" smtClean="0"/>
+              <a:t>Schläft </a:t>
+            </a:r>
+            <a:r>
+              <a:rPr lang="de-CH" dirty="0"/>
+              <a:t>bis Mittags, bleibt dafür aber bis früh morgens wach</a:t>
+            </a:r>
+          </a:p>
+          <a:p>
+            <a:r>
+              <a:rPr lang="de-CH" dirty="0" smtClean="0"/>
+              <a:t>Tätigkeiten</a:t>
+            </a:r>
+            <a:r>
+              <a:rPr lang="de-CH" dirty="0"/>
+              <a:t>: Fernsehen, PC Spiele, verlässt selten das Haus</a:t>
+            </a:r>
+          </a:p>
+          <a:p>
+            <a:r>
+              <a:rPr lang="de-CH" dirty="0" smtClean="0"/>
+              <a:t>Sein </a:t>
+            </a:r>
+            <a:r>
+              <a:rPr lang="de-CH" dirty="0"/>
+              <a:t>Freundeskreis beschränkt sich auf 3 Personen, welche ebenfalls ein Alkoholsuchtproblem aufweisen</a:t>
+            </a:r>
+          </a:p>
+          <a:p>
+            <a:r>
+              <a:rPr lang="de-CH" dirty="0" smtClean="0"/>
+              <a:t>Verpasst </a:t>
+            </a:r>
+            <a:r>
+              <a:rPr lang="de-CH" dirty="0"/>
+              <a:t>Termine für ärztliche Behandlung, beim RAV</a:t>
+            </a:r>
+          </a:p>
+          <a:p>
+            <a:r>
+              <a:rPr lang="de-CH" dirty="0" smtClean="0"/>
+              <a:t>Hat </a:t>
+            </a:r>
+            <a:r>
+              <a:rPr lang="de-CH" dirty="0"/>
+              <a:t>generell Mühe gesellschaftliche Verpflichtungen wahrzunehmen (Rechnungen bezahlen, Briefkasten leeren, Termine einhalten, sich an Abmachungen halten, etc.)</a:t>
+            </a:r>
+          </a:p>
+          <a:p>
+            <a:r>
+              <a:rPr lang="de-CH" dirty="0" smtClean="0"/>
+              <a:t>Ist </a:t>
+            </a:r>
+            <a:r>
+              <a:rPr lang="de-CH" dirty="0"/>
+              <a:t>verschuldet, Wohnung ist schmutzig und chaotisch</a:t>
+            </a:r>
+          </a:p>
+          <a:p>
+            <a:r>
+              <a:rPr lang="de-CH" dirty="0" smtClean="0"/>
+              <a:t>hat </a:t>
+            </a:r>
+            <a:r>
+              <a:rPr lang="de-CH" dirty="0"/>
+              <a:t>bereits 7x einen Entzug à 3 Wochen </a:t>
+            </a:r>
+            <a:r>
+              <a:rPr lang="de-CH" dirty="0" err="1"/>
+              <a:t>durchgefüht</a:t>
+            </a:r>
+            <a:r>
+              <a:rPr lang="de-CH" dirty="0"/>
+              <a:t>, ist aber immer wieder rückfällig geworden.</a:t>
+            </a:r>
           </a:p>
         </p:txBody>
       </p:sp>
     </p:spTree>
     <p:extLst>
       <p:ext uri="{BB962C8B-B14F-4D97-AF65-F5344CB8AC3E}">
-        <p14:creationId xmlns:p14="http://schemas.microsoft.com/office/powerpoint/2010/main" val="3453189645"/>
+        <p14:creationId xmlns:p14="http://schemas.microsoft.com/office/powerpoint/2010/main" val="3572740087"/>
       </p:ext>
     </p:extLst>
   </p:cSld>
@@ -3604,36 +3964,201 @@
           <a:lstStyle/>
           <a:p>
             <a:r>
-              <a:rPr lang="de-CH" dirty="0" smtClean="0"/>
-              <a:t>Prototypen</a:t>
+              <a:rPr lang="de-CH" dirty="0" err="1" smtClean="0"/>
+              <a:t>Personas</a:t>
+            </a:r>
+            <a:r>
+              <a:rPr lang="de-CH" dirty="0"/>
+              <a:t>, Persona "</a:t>
+            </a:r>
+            <a:r>
+              <a:rPr lang="de-CH" dirty="0" err="1"/>
+              <a:t>Ingrit</a:t>
+            </a:r>
+            <a:r>
+              <a:rPr lang="de-CH" dirty="0"/>
+              <a:t>"</a:t>
+            </a:r>
+          </a:p>
+        </p:txBody>
+      </p:sp>
+      <p:sp>
+        <p:nvSpPr>
+          <p:cNvPr id="3" name="Inhaltsplatzhalter 2"/>
+          <p:cNvSpPr>
+            <a:spLocks noGrp="1"/>
+          </p:cNvSpPr>
+          <p:nvPr>
+            <p:ph idx="1"/>
+          </p:nvPr>
+        </p:nvSpPr>
+        <p:spPr/>
+        <p:txBody>
+          <a:bodyPr>
+            <a:normAutofit fontScale="62500" lnSpcReduction="20000"/>
+          </a:bodyPr>
+          <a:lstStyle/>
+          <a:p>
+            <a:r>
+              <a:rPr lang="de-CH" dirty="0" smtClean="0"/>
+              <a:t>Arbeitet </a:t>
+            </a:r>
+            <a:r>
+              <a:rPr lang="de-CH" dirty="0"/>
+              <a:t>40% bei einem Sozialhilfeprogramm</a:t>
+            </a:r>
+          </a:p>
+          <a:p>
+            <a:r>
+              <a:rPr lang="de-CH" dirty="0" smtClean="0"/>
+              <a:t>Methadonabhängig</a:t>
             </a:r>
             <a:endParaRPr lang="de-CH" dirty="0"/>
           </a:p>
-        </p:txBody>
-      </p:sp>
-      <p:sp>
-        <p:nvSpPr>
-          <p:cNvPr id="3" name="Inhaltsplatzhalter 2"/>
-          <p:cNvSpPr>
-            <a:spLocks noGrp="1"/>
-          </p:cNvSpPr>
-          <p:nvPr>
-            <p:ph idx="1"/>
-          </p:nvPr>
-        </p:nvSpPr>
-        <p:spPr/>
-        <p:txBody>
-          <a:bodyPr/>
-          <a:lstStyle/>
-          <a:p>
-            <a:endParaRPr lang="de-CH"/>
+          <a:p>
+            <a:r>
+              <a:rPr lang="de-CH" dirty="0" smtClean="0"/>
+              <a:t>Ist </a:t>
+            </a:r>
+            <a:r>
+              <a:rPr lang="de-CH" dirty="0"/>
+              <a:t>in einem Methadonprogramm (2x pro Tag besucht sie die Methadonabgabestelle)</a:t>
+            </a:r>
+          </a:p>
+          <a:p>
+            <a:r>
+              <a:rPr lang="de-CH" dirty="0"/>
+              <a:t>L</a:t>
+            </a:r>
+            <a:r>
+              <a:rPr lang="de-CH" dirty="0" smtClean="0"/>
+              <a:t>ebt </a:t>
+            </a:r>
+            <a:r>
+              <a:rPr lang="de-CH" dirty="0"/>
+              <a:t>allein in 2-Zimmerwohung; häufiger Beziehungswechsel</a:t>
+            </a:r>
+          </a:p>
+          <a:p>
+            <a:r>
+              <a:rPr lang="de-CH" dirty="0" smtClean="0"/>
+              <a:t>Arbeitet </a:t>
+            </a:r>
+            <a:r>
+              <a:rPr lang="de-CH" dirty="0"/>
+              <a:t>an 4 Tagen morgens</a:t>
+            </a:r>
+          </a:p>
+          <a:p>
+            <a:r>
+              <a:rPr lang="de-CH" dirty="0"/>
+              <a:t>H</a:t>
+            </a:r>
+            <a:r>
+              <a:rPr lang="de-CH" dirty="0" smtClean="0"/>
+              <a:t>at </a:t>
+            </a:r>
+            <a:r>
+              <a:rPr lang="de-CH" dirty="0"/>
+              <a:t>Mühe mit gesellschaftlichen Verpflichtungen</a:t>
+            </a:r>
+          </a:p>
+          <a:p>
+            <a:r>
+              <a:rPr lang="de-CH" dirty="0"/>
+              <a:t>N</a:t>
+            </a:r>
+            <a:r>
+              <a:rPr lang="de-CH" dirty="0" smtClean="0"/>
+              <a:t>immt </a:t>
+            </a:r>
+            <a:r>
+              <a:rPr lang="de-CH" dirty="0"/>
+              <a:t>die meisten Termine wahr</a:t>
+            </a:r>
+          </a:p>
+          <a:p>
+            <a:r>
+              <a:rPr lang="de-CH" dirty="0"/>
+              <a:t>D</a:t>
+            </a:r>
+            <a:r>
+              <a:rPr lang="de-CH" dirty="0" smtClean="0"/>
+              <a:t>ie </a:t>
+            </a:r>
+            <a:r>
+              <a:rPr lang="de-CH" dirty="0"/>
+              <a:t>"aufsuchende Pflege" unterstützt sie bei den Administrativen Dingen (z.B. Rechnungen bezahlen, Wohnung aufräumen)</a:t>
+            </a:r>
+          </a:p>
+          <a:p>
+            <a:r>
+              <a:rPr lang="de-CH" dirty="0" smtClean="0"/>
+              <a:t>Ihr </a:t>
+            </a:r>
+            <a:r>
+              <a:rPr lang="de-CH" dirty="0"/>
+              <a:t>letzter Entzug liegt 2 Jahre zurück</a:t>
+            </a:r>
+          </a:p>
+          <a:p>
+            <a:r>
+              <a:rPr lang="de-CH" dirty="0" smtClean="0"/>
+              <a:t>Alter</a:t>
+            </a:r>
+            <a:r>
+              <a:rPr lang="de-CH" dirty="0"/>
+              <a:t>: 35</a:t>
+            </a:r>
+          </a:p>
+          <a:p>
+            <a:r>
+              <a:rPr lang="de-CH" dirty="0"/>
+              <a:t>D</a:t>
+            </a:r>
+            <a:r>
+              <a:rPr lang="de-CH" dirty="0" smtClean="0"/>
+              <a:t>ie </a:t>
+            </a:r>
+            <a:r>
+              <a:rPr lang="de-CH" dirty="0"/>
+              <a:t>meisten Ihrer Freunde haben Suchtprobleme</a:t>
+            </a:r>
+          </a:p>
+          <a:p>
+            <a:r>
+              <a:rPr lang="de-CH" dirty="0" smtClean="0"/>
+              <a:t>Sie </a:t>
+            </a:r>
+            <a:r>
+              <a:rPr lang="de-CH" dirty="0"/>
+              <a:t>schämt sich für ihre Sucht und meidet deshalb Personen aus dem "Nicht-Drogen-</a:t>
+            </a:r>
+            <a:r>
+              <a:rPr lang="de-CH" dirty="0" err="1"/>
+              <a:t>Millieu</a:t>
+            </a:r>
+            <a:r>
+              <a:rPr lang="de-CH" dirty="0"/>
+              <a:t>"</a:t>
+            </a:r>
+          </a:p>
+          <a:p>
+            <a:r>
+              <a:rPr lang="de-CH" dirty="0" smtClean="0"/>
+              <a:t>Ihr </a:t>
+            </a:r>
+            <a:r>
+              <a:rPr lang="de-CH" dirty="0"/>
+              <a:t>Leben ist teilweise strukturiert, sie möchte aber selbstständiger werden</a:t>
+            </a:r>
           </a:p>
         </p:txBody>
       </p:sp>
     </p:spTree>
     <p:extLst>
       <p:ext uri="{BB962C8B-B14F-4D97-AF65-F5344CB8AC3E}">
-        <p14:creationId xmlns:p14="http://schemas.microsoft.com/office/powerpoint/2010/main" val="1512302900"/>
+        <p14:creationId xmlns:p14="http://schemas.microsoft.com/office/powerpoint/2010/main" val="3135211607"/>
       </p:ext>
     </p:extLst>
   </p:cSld>
@@ -3676,36 +4201,294 @@
           <a:lstStyle/>
           <a:p>
             <a:r>
-              <a:rPr lang="de-CH" dirty="0" smtClean="0"/>
-              <a:t>Fragen</a:t>
+              <a:rPr lang="de-CH" dirty="0" err="1" smtClean="0"/>
+              <a:t>Personas</a:t>
+            </a:r>
+            <a:r>
+              <a:rPr lang="de-CH" dirty="0"/>
+              <a:t>, Persona "Hans"</a:t>
+            </a:r>
+          </a:p>
+        </p:txBody>
+      </p:sp>
+      <p:sp>
+        <p:nvSpPr>
+          <p:cNvPr id="3" name="Inhaltsplatzhalter 2"/>
+          <p:cNvSpPr>
+            <a:spLocks noGrp="1"/>
+          </p:cNvSpPr>
+          <p:nvPr>
+            <p:ph idx="1"/>
+          </p:nvPr>
+        </p:nvSpPr>
+        <p:spPr/>
+        <p:txBody>
+          <a:bodyPr>
+            <a:normAutofit fontScale="92500" lnSpcReduction="20000"/>
+          </a:bodyPr>
+          <a:lstStyle/>
+          <a:p>
+            <a:r>
+              <a:rPr lang="de-CH" dirty="0" smtClean="0"/>
+              <a:t>Ist </a:t>
+            </a:r>
+            <a:r>
+              <a:rPr lang="de-CH" dirty="0"/>
+              <a:t>arbeitslos</a:t>
+            </a:r>
+          </a:p>
+          <a:p>
+            <a:r>
+              <a:rPr lang="de-CH" dirty="0" smtClean="0"/>
+              <a:t>Heroinabhängig</a:t>
             </a:r>
             <a:endParaRPr lang="de-CH" dirty="0"/>
           </a:p>
-        </p:txBody>
-      </p:sp>
-      <p:sp>
-        <p:nvSpPr>
-          <p:cNvPr id="3" name="Inhaltsplatzhalter 2"/>
-          <p:cNvSpPr>
-            <a:spLocks noGrp="1"/>
-          </p:cNvSpPr>
-          <p:nvPr>
-            <p:ph idx="1"/>
-          </p:nvPr>
-        </p:nvSpPr>
-        <p:spPr/>
-        <p:txBody>
-          <a:bodyPr/>
-          <a:lstStyle/>
-          <a:p>
-            <a:endParaRPr lang="de-CH"/>
+          <a:p>
+            <a:r>
+              <a:rPr lang="de-CH" dirty="0" smtClean="0"/>
+              <a:t>Hat </a:t>
+            </a:r>
+            <a:r>
+              <a:rPr lang="de-CH" dirty="0"/>
+              <a:t>2 stationäre Entzugsprogramme gemacht, wurde wieder rückfällig</a:t>
+            </a:r>
+          </a:p>
+          <a:p>
+            <a:r>
+              <a:rPr lang="de-CH" dirty="0" smtClean="0"/>
+              <a:t>Schämt </a:t>
+            </a:r>
+            <a:r>
+              <a:rPr lang="de-CH" dirty="0"/>
+              <a:t>sich für seine Sucht, meidet Kontakte</a:t>
+            </a:r>
+          </a:p>
+          <a:p>
+            <a:r>
+              <a:rPr lang="de-CH" dirty="0" smtClean="0"/>
+              <a:t>Einzige </a:t>
+            </a:r>
+            <a:r>
+              <a:rPr lang="de-CH" dirty="0"/>
+              <a:t>Kontakte dienen der Beschaffung von Heroin</a:t>
+            </a:r>
+          </a:p>
+          <a:p>
+            <a:r>
+              <a:rPr lang="de-CH" dirty="0" smtClean="0"/>
+              <a:t>Hat </a:t>
+            </a:r>
+            <a:r>
+              <a:rPr lang="de-CH" dirty="0"/>
+              <a:t>sich schon prostituiert, um Geld für Heroin zu beschaffen</a:t>
+            </a:r>
+          </a:p>
+          <a:p>
+            <a:r>
+              <a:rPr lang="de-CH" dirty="0" smtClean="0"/>
+              <a:t>Wurde </a:t>
+            </a:r>
+            <a:r>
+              <a:rPr lang="de-CH" dirty="0"/>
+              <a:t>straffällig, um Geld oder Heroin zu besorgen</a:t>
+            </a:r>
+          </a:p>
+          <a:p>
+            <a:r>
+              <a:rPr lang="de-CH" dirty="0" smtClean="0"/>
+              <a:t>Ist </a:t>
+            </a:r>
+            <a:r>
+              <a:rPr lang="de-CH" dirty="0"/>
+              <a:t>verschuldet, da das Geld für die Droge ausgegeben wird</a:t>
+            </a:r>
+          </a:p>
+          <a:p>
+            <a:r>
+              <a:rPr lang="de-CH" dirty="0" smtClean="0"/>
+              <a:t>Hat </a:t>
+            </a:r>
+            <a:r>
+              <a:rPr lang="de-CH" dirty="0"/>
+              <a:t>gesundheitliche Probleme, ist unterernährt</a:t>
+            </a:r>
+          </a:p>
+          <a:p>
+            <a:r>
+              <a:rPr lang="de-CH" dirty="0" smtClean="0"/>
+              <a:t>Wohnt </a:t>
+            </a:r>
+            <a:r>
+              <a:rPr lang="de-CH" dirty="0"/>
+              <a:t>allein in einer 1-Zimmer Wohnung, kann keine Ordnung halten</a:t>
+            </a:r>
           </a:p>
         </p:txBody>
       </p:sp>
     </p:spTree>
     <p:extLst>
       <p:ext uri="{BB962C8B-B14F-4D97-AF65-F5344CB8AC3E}">
-        <p14:creationId xmlns:p14="http://schemas.microsoft.com/office/powerpoint/2010/main" val="1298196516"/>
+        <p14:creationId xmlns:p14="http://schemas.microsoft.com/office/powerpoint/2010/main" val="2669482693"/>
+      </p:ext>
+    </p:extLst>
+  </p:cSld>
+  <p:clrMapOvr>
+    <a:masterClrMapping/>
+  </p:clrMapOvr>
+</p:sld>
+</file>
+
+<file path=ppt/slides/slide9.xml><?xml version="1.0" encoding="utf-8"?>
+<p:sld xmlns:a="http://schemas.openxmlformats.org/drawingml/2006/main" xmlns:r="http://schemas.openxmlformats.org/officeDocument/2006/relationships" xmlns:p="http://schemas.openxmlformats.org/presentationml/2006/main">
+  <p:cSld>
+    <p:spTree>
+      <p:nvGrpSpPr>
+        <p:cNvPr id="1" name=""/>
+        <p:cNvGrpSpPr/>
+        <p:nvPr/>
+      </p:nvGrpSpPr>
+      <p:grpSpPr>
+        <a:xfrm>
+          <a:off x="0" y="0"/>
+          <a:ext cx="0" cy="0"/>
+          <a:chOff x="0" y="0"/>
+          <a:chExt cx="0" cy="0"/>
+        </a:xfrm>
+      </p:grpSpPr>
+      <p:sp>
+        <p:nvSpPr>
+          <p:cNvPr id="2" name="Titel 1"/>
+          <p:cNvSpPr>
+            <a:spLocks noGrp="1"/>
+          </p:cNvSpPr>
+          <p:nvPr>
+            <p:ph type="title"/>
+          </p:nvPr>
+        </p:nvSpPr>
+        <p:spPr/>
+        <p:txBody>
+          <a:bodyPr/>
+          <a:lstStyle/>
+          <a:p>
+            <a:r>
+              <a:rPr lang="de-CH" dirty="0" err="1" smtClean="0"/>
+              <a:t>Personas</a:t>
+            </a:r>
+            <a:r>
+              <a:rPr lang="de-CH" dirty="0"/>
+              <a:t>, Persona "Carin"</a:t>
+            </a:r>
+          </a:p>
+        </p:txBody>
+      </p:sp>
+      <p:sp>
+        <p:nvSpPr>
+          <p:cNvPr id="3" name="Inhaltsplatzhalter 2"/>
+          <p:cNvSpPr>
+            <a:spLocks noGrp="1"/>
+          </p:cNvSpPr>
+          <p:nvPr>
+            <p:ph idx="1"/>
+          </p:nvPr>
+        </p:nvSpPr>
+        <p:spPr/>
+        <p:txBody>
+          <a:bodyPr>
+            <a:normAutofit lnSpcReduction="10000"/>
+          </a:bodyPr>
+          <a:lstStyle/>
+          <a:p>
+            <a:r>
+              <a:rPr lang="de-CH" dirty="0" smtClean="0"/>
+              <a:t>Kifft</a:t>
+            </a:r>
+            <a:r>
+              <a:rPr lang="de-CH" dirty="0"/>
+              <a:t>, nimmt </a:t>
+            </a:r>
+            <a:r>
+              <a:rPr lang="de-CH" dirty="0" err="1"/>
+              <a:t>Extasy</a:t>
+            </a:r>
+            <a:endParaRPr lang="de-CH" dirty="0"/>
+          </a:p>
+          <a:p>
+            <a:r>
+              <a:rPr lang="de-CH" dirty="0" smtClean="0"/>
+              <a:t>Hat </a:t>
+            </a:r>
+            <a:r>
+              <a:rPr lang="de-CH" dirty="0"/>
+              <a:t>grosse Probleme, sich zu konzentrieren</a:t>
+            </a:r>
+          </a:p>
+          <a:p>
+            <a:r>
+              <a:rPr lang="de-CH" dirty="0" smtClean="0"/>
+              <a:t>Arbeitet </a:t>
+            </a:r>
+            <a:r>
+              <a:rPr lang="de-CH" dirty="0"/>
+              <a:t>Teilzeit bei einem Detailhändler im Lager</a:t>
+            </a:r>
+          </a:p>
+          <a:p>
+            <a:r>
+              <a:rPr lang="de-CH" dirty="0" smtClean="0"/>
+              <a:t>Hat </a:t>
+            </a:r>
+            <a:r>
+              <a:rPr lang="de-CH" dirty="0"/>
+              <a:t>häufig wechselnde Partner</a:t>
+            </a:r>
+          </a:p>
+          <a:p>
+            <a:r>
+              <a:rPr lang="de-CH" dirty="0" smtClean="0"/>
+              <a:t>Geht </a:t>
+            </a:r>
+            <a:r>
+              <a:rPr lang="de-CH" dirty="0"/>
+              <a:t>häufig an Partys, um die Drogen zu konsumieren</a:t>
+            </a:r>
+          </a:p>
+          <a:p>
+            <a:r>
+              <a:rPr lang="de-CH" dirty="0" smtClean="0"/>
+              <a:t>War </a:t>
+            </a:r>
+            <a:r>
+              <a:rPr lang="de-CH" dirty="0"/>
+              <a:t>noch nicht in Therapie, dies ist der erste Versuch</a:t>
+            </a:r>
+          </a:p>
+          <a:p>
+            <a:r>
+              <a:rPr lang="de-CH" smtClean="0"/>
+              <a:t>Hat </a:t>
+            </a:r>
+            <a:r>
+              <a:rPr lang="de-CH" dirty="0"/>
+              <a:t>eine kleine 2-Zimmer Wohnung in der Agglomeration</a:t>
+            </a:r>
+          </a:p>
+          <a:p>
+            <a:r>
+              <a:rPr lang="de-CH" smtClean="0"/>
+              <a:t>Versucht </a:t>
+            </a:r>
+            <a:r>
+              <a:rPr lang="de-CH" dirty="0"/>
+              <a:t>sich teilweise einzureden, dass ihre Drogen nur "weiche" Drogen sind und es nicht so schlimm ist</a:t>
+            </a:r>
+          </a:p>
+        </p:txBody>
+      </p:sp>
+    </p:spTree>
+    <p:extLst>
+      <p:ext uri="{BB962C8B-B14F-4D97-AF65-F5344CB8AC3E}">
+        <p14:creationId xmlns:p14="http://schemas.microsoft.com/office/powerpoint/2010/main" val="705968923"/>
       </p:ext>
     </p:extLst>
   </p:cSld>

</xml_diff>